<commit_message>
add bitcone reading chapter4&5 notes
</commit_message>
<xml_diff>
--- a/blockchain/bitcoin_ch4_5.pptx
+++ b/blockchain/bitcoin_ch4_5.pptx
@@ -108,6 +108,11 @@
       </a:defRPr>
     </a:lvl9pPr>
   </p:defaultTextStyle>
+  <p:extLst>
+    <p:ext uri="{EFAFB233-063F-42B5-8137-9DF3F51BA10A}">
+      <p15:sldGuideLst xmlns:p15="http://schemas.microsoft.com/office/powerpoint/2012/main"/>
+    </p:ext>
+  </p:extLst>
 </p:presentation>
 </file>
 
@@ -153,7 +158,7 @@
           </a:lstStyle>
           <a:p>
             <a:r>
-              <a:rPr lang="en-US" altLang="zh-CN" smtClean="0"/>
+              <a:rPr lang="en-US" altLang="zh-CN"/>
               <a:t>Click to edit Master title style</a:t>
             </a:r>
             <a:endParaRPr lang="zh-CN" altLang="en-US"/>
@@ -218,7 +223,7 @@
           </a:lstStyle>
           <a:p>
             <a:r>
-              <a:rPr lang="en-US" altLang="zh-CN" smtClean="0"/>
+              <a:rPr lang="en-US" altLang="zh-CN"/>
               <a:t>Click to edit Master subtitle style</a:t>
             </a:r>
             <a:endParaRPr lang="zh-CN" altLang="en-US"/>
@@ -336,7 +341,7 @@
           <a:lstStyle/>
           <a:p>
             <a:r>
-              <a:rPr lang="en-US" altLang="zh-CN" smtClean="0"/>
+              <a:rPr lang="en-US" altLang="zh-CN"/>
               <a:t>Click to edit Master title style</a:t>
             </a:r>
             <a:endParaRPr lang="zh-CN" altLang="en-US"/>
@@ -360,35 +365,35 @@
           <a:p>
             <a:pPr lvl="0"/>
             <a:r>
-              <a:rPr lang="en-US" altLang="zh-CN" smtClean="0"/>
+              <a:rPr lang="en-US" altLang="zh-CN"/>
               <a:t>Click to edit Master text styles</a:t>
             </a:r>
           </a:p>
           <a:p>
             <a:pPr lvl="1"/>
             <a:r>
-              <a:rPr lang="en-US" altLang="zh-CN" smtClean="0"/>
+              <a:rPr lang="en-US" altLang="zh-CN"/>
               <a:t>Second level</a:t>
             </a:r>
           </a:p>
           <a:p>
             <a:pPr lvl="2"/>
             <a:r>
-              <a:rPr lang="en-US" altLang="zh-CN" smtClean="0"/>
+              <a:rPr lang="en-US" altLang="zh-CN"/>
               <a:t>Third level</a:t>
             </a:r>
           </a:p>
           <a:p>
             <a:pPr lvl="3"/>
             <a:r>
-              <a:rPr lang="en-US" altLang="zh-CN" smtClean="0"/>
+              <a:rPr lang="en-US" altLang="zh-CN"/>
               <a:t>Fourth level</a:t>
             </a:r>
           </a:p>
           <a:p>
             <a:pPr lvl="4"/>
             <a:r>
-              <a:rPr lang="en-US" altLang="zh-CN" smtClean="0"/>
+              <a:rPr lang="en-US" altLang="zh-CN"/>
               <a:t>Fifth level</a:t>
             </a:r>
             <a:endParaRPr lang="zh-CN" altLang="en-US"/>
@@ -511,7 +516,7 @@
           <a:lstStyle/>
           <a:p>
             <a:r>
-              <a:rPr lang="en-US" altLang="zh-CN" smtClean="0"/>
+              <a:rPr lang="en-US" altLang="zh-CN"/>
               <a:t>Click to edit Master title style</a:t>
             </a:r>
             <a:endParaRPr lang="zh-CN" altLang="en-US"/>
@@ -540,35 +545,35 @@
           <a:p>
             <a:pPr lvl="0"/>
             <a:r>
-              <a:rPr lang="en-US" altLang="zh-CN" smtClean="0"/>
+              <a:rPr lang="en-US" altLang="zh-CN"/>
               <a:t>Click to edit Master text styles</a:t>
             </a:r>
           </a:p>
           <a:p>
             <a:pPr lvl="1"/>
             <a:r>
-              <a:rPr lang="en-US" altLang="zh-CN" smtClean="0"/>
+              <a:rPr lang="en-US" altLang="zh-CN"/>
               <a:t>Second level</a:t>
             </a:r>
           </a:p>
           <a:p>
             <a:pPr lvl="2"/>
             <a:r>
-              <a:rPr lang="en-US" altLang="zh-CN" smtClean="0"/>
+              <a:rPr lang="en-US" altLang="zh-CN"/>
               <a:t>Third level</a:t>
             </a:r>
           </a:p>
           <a:p>
             <a:pPr lvl="3"/>
             <a:r>
-              <a:rPr lang="en-US" altLang="zh-CN" smtClean="0"/>
+              <a:rPr lang="en-US" altLang="zh-CN"/>
               <a:t>Fourth level</a:t>
             </a:r>
           </a:p>
           <a:p>
             <a:pPr lvl="4"/>
             <a:r>
-              <a:rPr lang="en-US" altLang="zh-CN" smtClean="0"/>
+              <a:rPr lang="en-US" altLang="zh-CN"/>
               <a:t>Fifth level</a:t>
             </a:r>
             <a:endParaRPr lang="zh-CN" altLang="en-US"/>
@@ -686,7 +691,7 @@
           <a:lstStyle/>
           <a:p>
             <a:r>
-              <a:rPr lang="en-US" altLang="zh-CN" smtClean="0"/>
+              <a:rPr lang="en-US" altLang="zh-CN"/>
               <a:t>Click to edit Master title style</a:t>
             </a:r>
             <a:endParaRPr lang="zh-CN" altLang="en-US"/>
@@ -710,35 +715,35 @@
           <a:p>
             <a:pPr lvl="0"/>
             <a:r>
-              <a:rPr lang="en-US" altLang="zh-CN" smtClean="0"/>
+              <a:rPr lang="en-US" altLang="zh-CN"/>
               <a:t>Click to edit Master text styles</a:t>
             </a:r>
           </a:p>
           <a:p>
             <a:pPr lvl="1"/>
             <a:r>
-              <a:rPr lang="en-US" altLang="zh-CN" smtClean="0"/>
+              <a:rPr lang="en-US" altLang="zh-CN"/>
               <a:t>Second level</a:t>
             </a:r>
           </a:p>
           <a:p>
             <a:pPr lvl="2"/>
             <a:r>
-              <a:rPr lang="en-US" altLang="zh-CN" smtClean="0"/>
+              <a:rPr lang="en-US" altLang="zh-CN"/>
               <a:t>Third level</a:t>
             </a:r>
           </a:p>
           <a:p>
             <a:pPr lvl="3"/>
             <a:r>
-              <a:rPr lang="en-US" altLang="zh-CN" smtClean="0"/>
+              <a:rPr lang="en-US" altLang="zh-CN"/>
               <a:t>Fourth level</a:t>
             </a:r>
           </a:p>
           <a:p>
             <a:pPr lvl="4"/>
             <a:r>
-              <a:rPr lang="en-US" altLang="zh-CN" smtClean="0"/>
+              <a:rPr lang="en-US" altLang="zh-CN"/>
               <a:t>Fifth level</a:t>
             </a:r>
             <a:endParaRPr lang="zh-CN" altLang="en-US"/>
@@ -865,7 +870,7 @@
           </a:lstStyle>
           <a:p>
             <a:r>
-              <a:rPr lang="en-US" altLang="zh-CN" smtClean="0"/>
+              <a:rPr lang="en-US" altLang="zh-CN"/>
               <a:t>Click to edit Master title style</a:t>
             </a:r>
             <a:endParaRPr lang="zh-CN" altLang="en-US"/>
@@ -985,7 +990,7 @@
           <a:p>
             <a:pPr lvl="0"/>
             <a:r>
-              <a:rPr lang="en-US" altLang="zh-CN" smtClean="0"/>
+              <a:rPr lang="en-US" altLang="zh-CN"/>
               <a:t>Click to edit Master text styles</a:t>
             </a:r>
           </a:p>
@@ -1102,7 +1107,7 @@
           <a:lstStyle/>
           <a:p>
             <a:r>
-              <a:rPr lang="en-US" altLang="zh-CN" smtClean="0"/>
+              <a:rPr lang="en-US" altLang="zh-CN"/>
               <a:t>Click to edit Master title style</a:t>
             </a:r>
             <a:endParaRPr lang="zh-CN" altLang="en-US"/>
@@ -1131,35 +1136,35 @@
           <a:p>
             <a:pPr lvl="0"/>
             <a:r>
-              <a:rPr lang="en-US" altLang="zh-CN" smtClean="0"/>
+              <a:rPr lang="en-US" altLang="zh-CN"/>
               <a:t>Click to edit Master text styles</a:t>
             </a:r>
           </a:p>
           <a:p>
             <a:pPr lvl="1"/>
             <a:r>
-              <a:rPr lang="en-US" altLang="zh-CN" smtClean="0"/>
+              <a:rPr lang="en-US" altLang="zh-CN"/>
               <a:t>Second level</a:t>
             </a:r>
           </a:p>
           <a:p>
             <a:pPr lvl="2"/>
             <a:r>
-              <a:rPr lang="en-US" altLang="zh-CN" smtClean="0"/>
+              <a:rPr lang="en-US" altLang="zh-CN"/>
               <a:t>Third level</a:t>
             </a:r>
           </a:p>
           <a:p>
             <a:pPr lvl="3"/>
             <a:r>
-              <a:rPr lang="en-US" altLang="zh-CN" smtClean="0"/>
+              <a:rPr lang="en-US" altLang="zh-CN"/>
               <a:t>Fourth level</a:t>
             </a:r>
           </a:p>
           <a:p>
             <a:pPr lvl="4"/>
             <a:r>
-              <a:rPr lang="en-US" altLang="zh-CN" smtClean="0"/>
+              <a:rPr lang="en-US" altLang="zh-CN"/>
               <a:t>Fifth level</a:t>
             </a:r>
             <a:endParaRPr lang="zh-CN" altLang="en-US"/>
@@ -1188,35 +1193,35 @@
           <a:p>
             <a:pPr lvl="0"/>
             <a:r>
-              <a:rPr lang="en-US" altLang="zh-CN" smtClean="0"/>
+              <a:rPr lang="en-US" altLang="zh-CN"/>
               <a:t>Click to edit Master text styles</a:t>
             </a:r>
           </a:p>
           <a:p>
             <a:pPr lvl="1"/>
             <a:r>
-              <a:rPr lang="en-US" altLang="zh-CN" smtClean="0"/>
+              <a:rPr lang="en-US" altLang="zh-CN"/>
               <a:t>Second level</a:t>
             </a:r>
           </a:p>
           <a:p>
             <a:pPr lvl="2"/>
             <a:r>
-              <a:rPr lang="en-US" altLang="zh-CN" smtClean="0"/>
+              <a:rPr lang="en-US" altLang="zh-CN"/>
               <a:t>Third level</a:t>
             </a:r>
           </a:p>
           <a:p>
             <a:pPr lvl="3"/>
             <a:r>
-              <a:rPr lang="en-US" altLang="zh-CN" smtClean="0"/>
+              <a:rPr lang="en-US" altLang="zh-CN"/>
               <a:t>Fourth level</a:t>
             </a:r>
           </a:p>
           <a:p>
             <a:pPr lvl="4"/>
             <a:r>
-              <a:rPr lang="en-US" altLang="zh-CN" smtClean="0"/>
+              <a:rPr lang="en-US" altLang="zh-CN"/>
               <a:t>Fifth level</a:t>
             </a:r>
             <a:endParaRPr lang="zh-CN" altLang="en-US"/>
@@ -1339,7 +1344,7 @@
           <a:lstStyle/>
           <a:p>
             <a:r>
-              <a:rPr lang="en-US" altLang="zh-CN" smtClean="0"/>
+              <a:rPr lang="en-US" altLang="zh-CN"/>
               <a:t>Click to edit Master title style</a:t>
             </a:r>
             <a:endParaRPr lang="zh-CN" altLang="en-US"/>
@@ -1405,7 +1410,7 @@
           <a:p>
             <a:pPr lvl="0"/>
             <a:r>
-              <a:rPr lang="en-US" altLang="zh-CN" smtClean="0"/>
+              <a:rPr lang="en-US" altLang="zh-CN"/>
               <a:t>Click to edit Master text styles</a:t>
             </a:r>
           </a:p>
@@ -1433,35 +1438,35 @@
           <a:p>
             <a:pPr lvl="0"/>
             <a:r>
-              <a:rPr lang="en-US" altLang="zh-CN" smtClean="0"/>
+              <a:rPr lang="en-US" altLang="zh-CN"/>
               <a:t>Click to edit Master text styles</a:t>
             </a:r>
           </a:p>
           <a:p>
             <a:pPr lvl="1"/>
             <a:r>
-              <a:rPr lang="en-US" altLang="zh-CN" smtClean="0"/>
+              <a:rPr lang="en-US" altLang="zh-CN"/>
               <a:t>Second level</a:t>
             </a:r>
           </a:p>
           <a:p>
             <a:pPr lvl="2"/>
             <a:r>
-              <a:rPr lang="en-US" altLang="zh-CN" smtClean="0"/>
+              <a:rPr lang="en-US" altLang="zh-CN"/>
               <a:t>Third level</a:t>
             </a:r>
           </a:p>
           <a:p>
             <a:pPr lvl="3"/>
             <a:r>
-              <a:rPr lang="en-US" altLang="zh-CN" smtClean="0"/>
+              <a:rPr lang="en-US" altLang="zh-CN"/>
               <a:t>Fourth level</a:t>
             </a:r>
           </a:p>
           <a:p>
             <a:pPr lvl="4"/>
             <a:r>
-              <a:rPr lang="en-US" altLang="zh-CN" smtClean="0"/>
+              <a:rPr lang="en-US" altLang="zh-CN"/>
               <a:t>Fifth level</a:t>
             </a:r>
             <a:endParaRPr lang="zh-CN" altLang="en-US"/>
@@ -1527,7 +1532,7 @@
           <a:p>
             <a:pPr lvl="0"/>
             <a:r>
-              <a:rPr lang="en-US" altLang="zh-CN" smtClean="0"/>
+              <a:rPr lang="en-US" altLang="zh-CN"/>
               <a:t>Click to edit Master text styles</a:t>
             </a:r>
           </a:p>
@@ -1555,35 +1560,35 @@
           <a:p>
             <a:pPr lvl="0"/>
             <a:r>
-              <a:rPr lang="en-US" altLang="zh-CN" smtClean="0"/>
+              <a:rPr lang="en-US" altLang="zh-CN"/>
               <a:t>Click to edit Master text styles</a:t>
             </a:r>
           </a:p>
           <a:p>
             <a:pPr lvl="1"/>
             <a:r>
-              <a:rPr lang="en-US" altLang="zh-CN" smtClean="0"/>
+              <a:rPr lang="en-US" altLang="zh-CN"/>
               <a:t>Second level</a:t>
             </a:r>
           </a:p>
           <a:p>
             <a:pPr lvl="2"/>
             <a:r>
-              <a:rPr lang="en-US" altLang="zh-CN" smtClean="0"/>
+              <a:rPr lang="en-US" altLang="zh-CN"/>
               <a:t>Third level</a:t>
             </a:r>
           </a:p>
           <a:p>
             <a:pPr lvl="3"/>
             <a:r>
-              <a:rPr lang="en-US" altLang="zh-CN" smtClean="0"/>
+              <a:rPr lang="en-US" altLang="zh-CN"/>
               <a:t>Fourth level</a:t>
             </a:r>
           </a:p>
           <a:p>
             <a:pPr lvl="4"/>
             <a:r>
-              <a:rPr lang="en-US" altLang="zh-CN" smtClean="0"/>
+              <a:rPr lang="en-US" altLang="zh-CN"/>
               <a:t>Fifth level</a:t>
             </a:r>
             <a:endParaRPr lang="zh-CN" altLang="en-US"/>
@@ -1701,7 +1706,7 @@
           <a:lstStyle/>
           <a:p>
             <a:r>
-              <a:rPr lang="en-US" altLang="zh-CN" smtClean="0"/>
+              <a:rPr lang="en-US" altLang="zh-CN"/>
               <a:t>Click to edit Master title style</a:t>
             </a:r>
             <a:endParaRPr lang="zh-CN" altLang="en-US"/>
@@ -1923,7 +1928,7 @@
           </a:lstStyle>
           <a:p>
             <a:r>
-              <a:rPr lang="en-US" altLang="zh-CN" smtClean="0"/>
+              <a:rPr lang="en-US" altLang="zh-CN"/>
               <a:t>Click to edit Master title style</a:t>
             </a:r>
             <a:endParaRPr lang="zh-CN" altLang="en-US"/>
@@ -1980,35 +1985,35 @@
           <a:p>
             <a:pPr lvl="0"/>
             <a:r>
-              <a:rPr lang="en-US" altLang="zh-CN" smtClean="0"/>
+              <a:rPr lang="en-US" altLang="zh-CN"/>
               <a:t>Click to edit Master text styles</a:t>
             </a:r>
           </a:p>
           <a:p>
             <a:pPr lvl="1"/>
             <a:r>
-              <a:rPr lang="en-US" altLang="zh-CN" smtClean="0"/>
+              <a:rPr lang="en-US" altLang="zh-CN"/>
               <a:t>Second level</a:t>
             </a:r>
           </a:p>
           <a:p>
             <a:pPr lvl="2"/>
             <a:r>
-              <a:rPr lang="en-US" altLang="zh-CN" smtClean="0"/>
+              <a:rPr lang="en-US" altLang="zh-CN"/>
               <a:t>Third level</a:t>
             </a:r>
           </a:p>
           <a:p>
             <a:pPr lvl="3"/>
             <a:r>
-              <a:rPr lang="en-US" altLang="zh-CN" smtClean="0"/>
+              <a:rPr lang="en-US" altLang="zh-CN"/>
               <a:t>Fourth level</a:t>
             </a:r>
           </a:p>
           <a:p>
             <a:pPr lvl="4"/>
             <a:r>
-              <a:rPr lang="en-US" altLang="zh-CN" smtClean="0"/>
+              <a:rPr lang="en-US" altLang="zh-CN"/>
               <a:t>Fifth level</a:t>
             </a:r>
             <a:endParaRPr lang="zh-CN" altLang="en-US"/>
@@ -2074,7 +2079,7 @@
           <a:p>
             <a:pPr lvl="0"/>
             <a:r>
-              <a:rPr lang="en-US" altLang="zh-CN" smtClean="0"/>
+              <a:rPr lang="en-US" altLang="zh-CN"/>
               <a:t>Click to edit Master text styles</a:t>
             </a:r>
           </a:p>
@@ -2200,7 +2205,7 @@
           </a:lstStyle>
           <a:p>
             <a:r>
-              <a:rPr lang="en-US" altLang="zh-CN" smtClean="0"/>
+              <a:rPr lang="en-US" altLang="zh-CN"/>
               <a:t>Click to edit Master title style</a:t>
             </a:r>
             <a:endParaRPr lang="zh-CN" altLang="en-US"/>
@@ -2327,7 +2332,7 @@
           <a:p>
             <a:pPr lvl="0"/>
             <a:r>
-              <a:rPr lang="en-US" altLang="zh-CN" smtClean="0"/>
+              <a:rPr lang="en-US" altLang="zh-CN"/>
               <a:t>Click to edit Master text styles</a:t>
             </a:r>
           </a:p>
@@ -2459,7 +2464,7 @@
           <a:lstStyle/>
           <a:p>
             <a:r>
-              <a:rPr lang="en-US" altLang="zh-CN" smtClean="0"/>
+              <a:rPr lang="en-US" altLang="zh-CN"/>
               <a:t>Click to edit Master title style</a:t>
             </a:r>
             <a:endParaRPr lang="zh-CN" altLang="en-US"/>
@@ -2493,35 +2498,35 @@
           <a:p>
             <a:pPr lvl="0"/>
             <a:r>
-              <a:rPr lang="en-US" altLang="zh-CN" smtClean="0"/>
+              <a:rPr lang="en-US" altLang="zh-CN"/>
               <a:t>Click to edit Master text styles</a:t>
             </a:r>
           </a:p>
           <a:p>
             <a:pPr lvl="1"/>
             <a:r>
-              <a:rPr lang="en-US" altLang="zh-CN" smtClean="0"/>
+              <a:rPr lang="en-US" altLang="zh-CN"/>
               <a:t>Second level</a:t>
             </a:r>
           </a:p>
           <a:p>
             <a:pPr lvl="2"/>
             <a:r>
-              <a:rPr lang="en-US" altLang="zh-CN" smtClean="0"/>
+              <a:rPr lang="en-US" altLang="zh-CN"/>
               <a:t>Third level</a:t>
             </a:r>
           </a:p>
           <a:p>
             <a:pPr lvl="3"/>
             <a:r>
-              <a:rPr lang="en-US" altLang="zh-CN" smtClean="0"/>
+              <a:rPr lang="en-US" altLang="zh-CN"/>
               <a:t>Fourth level</a:t>
             </a:r>
           </a:p>
           <a:p>
             <a:pPr lvl="4"/>
             <a:r>
-              <a:rPr lang="en-US" altLang="zh-CN" smtClean="0"/>
+              <a:rPr lang="en-US" altLang="zh-CN"/>
               <a:t>Fifth level</a:t>
             </a:r>
             <a:endParaRPr lang="zh-CN" altLang="en-US"/>
@@ -2991,7 +2996,7 @@
           <a:lstStyle/>
           <a:p>
             <a:r>
-              <a:rPr lang="en-US" altLang="zh-CN" sz="3600" baseline="30000" dirty="0" err="1" smtClean="0">
+              <a:rPr lang="en-US" altLang="zh-CN" sz="3600" baseline="30000" dirty="0" err="1">
                 <a:latin typeface="Gadugi" panose="020B0502040204020203" pitchFamily="34" charset="0"/>
                 <a:ea typeface="Gadugi" panose="020B0502040204020203" pitchFamily="34" charset="0"/>
                 <a:cs typeface="Arial Unicode MS" panose="020B0604020202020204" pitchFamily="34" charset="-122"/>
@@ -2999,7 +3004,7 @@
               <a:t>PoW</a:t>
             </a:r>
             <a:r>
-              <a:rPr lang="zh-CN" altLang="en-US" sz="3600" baseline="30000" dirty="0" smtClean="0">
+              <a:rPr lang="zh-CN" altLang="en-US" sz="3600" baseline="30000" dirty="0">
                 <a:latin typeface="Gadugi" panose="020B0502040204020203" pitchFamily="34" charset="0"/>
                 <a:ea typeface="Gadugi" panose="020B0502040204020203" pitchFamily="34" charset="0"/>
                 <a:cs typeface="Arial Unicode MS" panose="020B0604020202020204" pitchFamily="34" charset="-122"/>
@@ -3007,7 +3012,7 @@
               <a:t>（</a:t>
             </a:r>
             <a:r>
-              <a:rPr lang="en-US" altLang="zh-CN" sz="3600" baseline="30000" dirty="0" smtClean="0">
+              <a:rPr lang="en-US" altLang="zh-CN" sz="3600" baseline="30000" dirty="0">
                 <a:latin typeface="Gadugi" panose="020B0502040204020203" pitchFamily="34" charset="0"/>
                 <a:ea typeface="Gadugi" panose="020B0502040204020203" pitchFamily="34" charset="0"/>
                 <a:cs typeface="Arial Unicode MS" panose="020B0604020202020204" pitchFamily="34" charset="-122"/>
@@ -3015,7 +3020,7 @@
               <a:t>Proof of Work</a:t>
             </a:r>
             <a:r>
-              <a:rPr lang="zh-CN" altLang="en-US" sz="3600" baseline="30000" dirty="0" smtClean="0">
+              <a:rPr lang="zh-CN" altLang="en-US" sz="3600" baseline="30000" dirty="0">
                 <a:latin typeface="Gadugi" panose="020B0502040204020203" pitchFamily="34" charset="0"/>
                 <a:ea typeface="Gadugi" panose="020B0502040204020203" pitchFamily="34" charset="0"/>
                 <a:cs typeface="Arial Unicode MS" panose="020B0604020202020204" pitchFamily="34" charset="-122"/>
@@ -3023,7 +3028,7 @@
               <a:t>）</a:t>
             </a:r>
             <a:r>
-              <a:rPr lang="en-US" altLang="zh-CN" sz="3600" dirty="0" smtClean="0">
+              <a:rPr lang="en-US" altLang="zh-CN" sz="3600" dirty="0">
                 <a:latin typeface="Gadugi" panose="020B0502040204020203" pitchFamily="34" charset="0"/>
                 <a:ea typeface="Gadugi" panose="020B0502040204020203" pitchFamily="34" charset="0"/>
                 <a:cs typeface="Arial Unicode MS" panose="020B0604020202020204" pitchFamily="34" charset="-122"/>
@@ -3034,48 +3039,48 @@
           </a:p>
           <a:p>
             <a:r>
-              <a:rPr lang="zh-CN" altLang="en-US" sz="2400" dirty="0" smtClean="0">
+              <a:rPr lang="zh-CN" altLang="en-US" sz="2400" dirty="0">
                 <a:latin typeface="+mn-ea"/>
               </a:rPr>
               <a:t>为了创建区块，每个节点都要完成一项称为</a:t>
             </a:r>
             <a:r>
-              <a:rPr lang="en-US" altLang="zh-CN" sz="2400" dirty="0" err="1" smtClean="0">
+              <a:rPr lang="en-US" altLang="zh-CN" sz="2400" dirty="0" err="1">
                 <a:latin typeface="+mn-ea"/>
               </a:rPr>
               <a:t>PoW</a:t>
             </a:r>
             <a:r>
-              <a:rPr lang="zh-CN" altLang="en-US" sz="2400" dirty="0" smtClean="0">
+              <a:rPr lang="zh-CN" altLang="en-US" sz="2400" dirty="0">
                 <a:latin typeface="+mn-ea"/>
               </a:rPr>
               <a:t>的任务。该任务完成的条件是，节点找到一个特定</a:t>
             </a:r>
             <a:r>
-              <a:rPr lang="en-US" altLang="zh-CN" sz="2400" dirty="0" err="1" smtClean="0">
+              <a:rPr lang="en-US" altLang="zh-CN" sz="2400" dirty="0" err="1">
                 <a:latin typeface="+mn-ea"/>
               </a:rPr>
               <a:t>Nounce</a:t>
             </a:r>
             <a:r>
-              <a:rPr lang="zh-CN" altLang="en-US" sz="2400" dirty="0" smtClean="0">
+              <a:rPr lang="zh-CN" altLang="en-US" sz="2400" dirty="0">
                 <a:latin typeface="+mn-ea"/>
               </a:rPr>
               <a:t>，使得待创建区块的哈希值是由一系列</a:t>
             </a:r>
             <a:r>
-              <a:rPr lang="en-US" altLang="zh-CN" sz="2400" dirty="0" smtClean="0">
+              <a:rPr lang="en-US" altLang="zh-CN" sz="2400" dirty="0">
                 <a:latin typeface="+mn-ea"/>
               </a:rPr>
               <a:t>0</a:t>
             </a:r>
             <a:r>
-              <a:rPr lang="zh-CN" altLang="en-US" sz="2400" dirty="0" smtClean="0">
+              <a:rPr lang="zh-CN" altLang="en-US" sz="2400" dirty="0">
                 <a:latin typeface="+mn-ea"/>
               </a:rPr>
               <a:t>位开始。这类似于一场所有节点都参与的竞赛，最先胜出的节点创建区块，并将新创建的区块广播给其他节点。</a:t>
             </a:r>
-            <a:endParaRPr lang="en-US" altLang="zh-CN" sz="2000" dirty="0" smtClean="0">
+            <a:endParaRPr lang="en-US" altLang="zh-CN" sz="2000" dirty="0">
               <a:latin typeface="+mn-ea"/>
             </a:endParaRPr>
           </a:p>
@@ -3301,7 +3306,7 @@
           <a:lstStyle/>
           <a:p>
             <a:r>
-              <a:rPr lang="en-US" altLang="zh-CN" sz="3600" baseline="30000" dirty="0" err="1" smtClean="0">
+              <a:rPr lang="en-US" altLang="zh-CN" sz="3600" baseline="30000" dirty="0" err="1">
                 <a:latin typeface="Gadugi" panose="020B0502040204020203" pitchFamily="34" charset="0"/>
                 <a:ea typeface="Gadugi" panose="020B0502040204020203" pitchFamily="34" charset="0"/>
                 <a:cs typeface="Arial Unicode MS" panose="020B0604020202020204" pitchFamily="34" charset="-122"/>
@@ -3309,7 +3314,7 @@
               <a:t>PoW</a:t>
             </a:r>
             <a:r>
-              <a:rPr lang="zh-CN" altLang="en-US" sz="3600" baseline="30000" dirty="0" smtClean="0">
+              <a:rPr lang="zh-CN" altLang="en-US" sz="3600" baseline="30000" dirty="0">
                 <a:latin typeface="Gadugi" panose="020B0502040204020203" pitchFamily="34" charset="0"/>
                 <a:ea typeface="Gadugi" panose="020B0502040204020203" pitchFamily="34" charset="0"/>
                 <a:cs typeface="Arial Unicode MS" panose="020B0604020202020204" pitchFamily="34" charset="-122"/>
@@ -3317,7 +3322,7 @@
               <a:t>（</a:t>
             </a:r>
             <a:r>
-              <a:rPr lang="en-US" altLang="zh-CN" sz="3600" baseline="30000" dirty="0" smtClean="0">
+              <a:rPr lang="en-US" altLang="zh-CN" sz="3600" baseline="30000" dirty="0">
                 <a:latin typeface="Gadugi" panose="020B0502040204020203" pitchFamily="34" charset="0"/>
                 <a:ea typeface="Gadugi" panose="020B0502040204020203" pitchFamily="34" charset="0"/>
                 <a:cs typeface="Arial Unicode MS" panose="020B0604020202020204" pitchFamily="34" charset="-122"/>
@@ -3325,21 +3330,21 @@
               <a:t>Proof of Work</a:t>
             </a:r>
             <a:r>
-              <a:rPr lang="zh-CN" altLang="en-US" sz="3600" baseline="30000" dirty="0" smtClean="0">
+              <a:rPr lang="zh-CN" altLang="en-US" sz="3600" baseline="30000" dirty="0">
                 <a:latin typeface="Gadugi" panose="020B0502040204020203" pitchFamily="34" charset="0"/>
                 <a:ea typeface="Gadugi" panose="020B0502040204020203" pitchFamily="34" charset="0"/>
                 <a:cs typeface="Arial Unicode MS" panose="020B0604020202020204" pitchFamily="34" charset="-122"/>
               </a:rPr>
               <a:t>）</a:t>
             </a:r>
-            <a:endParaRPr lang="en-US" altLang="zh-CN" sz="2400" dirty="0" smtClean="0">
+            <a:endParaRPr lang="en-US" altLang="zh-CN" sz="2400" dirty="0">
               <a:latin typeface="+mn-ea"/>
               <a:cs typeface="Arial Unicode MS" panose="020B0604020202020204" pitchFamily="34" charset="-122"/>
             </a:endParaRPr>
           </a:p>
           <a:p>
             <a:r>
-              <a:rPr lang="zh-CN" altLang="en-US" sz="2400" dirty="0" smtClean="0">
+              <a:rPr lang="zh-CN" altLang="en-US" sz="2400" dirty="0">
                 <a:latin typeface="+mn-ea"/>
                 <a:cs typeface="Arial Unicode MS" panose="020B0604020202020204" pitchFamily="34" charset="-122"/>
               </a:rPr>
@@ -3357,54 +3362,54 @@
             </a:endParaRPr>
           </a:p>
           <a:p>
-            <a:endParaRPr lang="en-US" altLang="zh-CN" sz="2400" dirty="0" smtClean="0">
-              <a:latin typeface="+mn-ea"/>
-              <a:cs typeface="Arial Unicode MS" panose="020B0604020202020204" pitchFamily="34" charset="-122"/>
-            </a:endParaRPr>
-          </a:p>
-          <a:p>
             <a:endParaRPr lang="en-US" altLang="zh-CN" sz="2400" dirty="0">
               <a:latin typeface="+mn-ea"/>
               <a:cs typeface="Arial Unicode MS" panose="020B0604020202020204" pitchFamily="34" charset="-122"/>
             </a:endParaRPr>
           </a:p>
           <a:p>
-            <a:endParaRPr lang="en-US" altLang="zh-CN" sz="2400" dirty="0" smtClean="0">
+            <a:endParaRPr lang="en-US" altLang="zh-CN" sz="2400" dirty="0">
               <a:latin typeface="+mn-ea"/>
               <a:cs typeface="Arial Unicode MS" panose="020B0604020202020204" pitchFamily="34" charset="-122"/>
             </a:endParaRPr>
           </a:p>
           <a:p>
-            <a:r>
-              <a:rPr lang="zh-CN" altLang="en-US" sz="2400" dirty="0" smtClean="0">
+            <a:endParaRPr lang="en-US" altLang="zh-CN" sz="2400" dirty="0">
+              <a:latin typeface="+mn-ea"/>
+              <a:cs typeface="Arial Unicode MS" panose="020B0604020202020204" pitchFamily="34" charset="-122"/>
+            </a:endParaRPr>
+          </a:p>
+          <a:p>
+            <a:r>
+              <a:rPr lang="zh-CN" altLang="en-US" sz="2400" dirty="0">
                 <a:latin typeface="+mn-ea"/>
                 <a:cs typeface="Arial Unicode MS" panose="020B0604020202020204" pitchFamily="34" charset="-122"/>
               </a:rPr>
               <a:t>若要改动某个区块中的信息，则需要修改该区块的内容及其后续所有区块的</a:t>
             </a:r>
             <a:r>
-              <a:rPr lang="en-US" altLang="zh-CN" sz="2400" dirty="0" err="1" smtClean="0">
+              <a:rPr lang="en-US" altLang="zh-CN" sz="2400" dirty="0" err="1">
                 <a:latin typeface="+mn-ea"/>
                 <a:cs typeface="Arial Unicode MS" panose="020B0604020202020204" pitchFamily="34" charset="-122"/>
               </a:rPr>
               <a:t>prevHash</a:t>
             </a:r>
             <a:r>
-              <a:rPr lang="zh-CN" altLang="en-US" sz="2400" dirty="0" smtClean="0">
+              <a:rPr lang="zh-CN" altLang="en-US" sz="2400" dirty="0">
                 <a:latin typeface="+mn-ea"/>
                 <a:cs typeface="Arial Unicode MS" panose="020B0604020202020204" pitchFamily="34" charset="-122"/>
               </a:rPr>
               <a:t>，也就是说需要对该区块及后续区块再做一次</a:t>
             </a:r>
             <a:r>
-              <a:rPr lang="en-US" altLang="zh-CN" sz="2400" dirty="0" err="1" smtClean="0">
+              <a:rPr lang="en-US" altLang="zh-CN" sz="2400" dirty="0" err="1">
                 <a:latin typeface="+mn-ea"/>
                 <a:cs typeface="Arial Unicode MS" panose="020B0604020202020204" pitchFamily="34" charset="-122"/>
               </a:rPr>
               <a:t>PoW</a:t>
             </a:r>
             <a:r>
-              <a:rPr lang="zh-CN" altLang="en-US" sz="2400" dirty="0" smtClean="0">
+              <a:rPr lang="zh-CN" altLang="en-US" sz="2400" dirty="0">
                 <a:latin typeface="+mn-ea"/>
                 <a:cs typeface="Arial Unicode MS" panose="020B0604020202020204" pitchFamily="34" charset="-122"/>
               </a:rPr>
@@ -3764,33 +3769,33 @@
           <a:lstStyle/>
           <a:p>
             <a:r>
-              <a:rPr lang="en-US" altLang="zh-CN" sz="4000" baseline="30000" dirty="0" smtClean="0"/>
+              <a:rPr lang="en-US" altLang="zh-CN" sz="4000" baseline="30000" dirty="0"/>
               <a:t>Hash Function</a:t>
             </a:r>
-            <a:endParaRPr lang="en-US" altLang="zh-CN" dirty="0" smtClean="0"/>
-          </a:p>
-          <a:p>
-            <a:r>
-              <a:rPr lang="en-US" altLang="zh-CN" dirty="0" smtClean="0"/>
+            <a:endParaRPr lang="en-US" altLang="zh-CN" dirty="0"/>
+          </a:p>
+          <a:p>
+            <a:r>
+              <a:rPr lang="en-US" altLang="zh-CN" dirty="0"/>
               <a:t>+  </a:t>
             </a:r>
             <a:r>
-              <a:rPr lang="zh-CN" altLang="en-US" dirty="0" smtClean="0"/>
+              <a:rPr lang="zh-CN" altLang="en-US" dirty="0"/>
               <a:t>输入任意长度、任意内容的数据</a:t>
             </a:r>
-            <a:endParaRPr lang="en-US" altLang="zh-CN" dirty="0" smtClean="0"/>
-          </a:p>
-          <a:p>
-            <a:r>
-              <a:rPr lang="en-US" altLang="zh-CN" dirty="0" smtClean="0"/>
+            <a:endParaRPr lang="en-US" altLang="zh-CN" dirty="0"/>
+          </a:p>
+          <a:p>
+            <a:r>
+              <a:rPr lang="en-US" altLang="zh-CN" dirty="0"/>
               <a:t>+  </a:t>
             </a:r>
             <a:r>
-              <a:rPr lang="zh-CN" altLang="en-US" dirty="0" smtClean="0"/>
+              <a:rPr lang="zh-CN" altLang="en-US" dirty="0"/>
               <a:t>输出固定长度的数据，比如</a:t>
             </a:r>
             <a:r>
-              <a:rPr lang="en-US" altLang="zh-CN" dirty="0" smtClean="0"/>
+              <a:rPr lang="en-US" altLang="zh-CN" dirty="0"/>
               <a:t>256bit</a:t>
             </a:r>
             <a:endParaRPr lang="zh-CN" altLang="en-US" dirty="0"/>
@@ -3858,7 +3863,7 @@
             <a:lstStyle/>
             <a:p>
               <a:r>
-                <a:rPr lang="en-US" altLang="zh-CN" dirty="0" smtClean="0"/>
+                <a:rPr lang="en-US" altLang="zh-CN" dirty="0"/>
                 <a:t>SHA-256:</a:t>
               </a:r>
               <a:endParaRPr lang="zh-CN" altLang="en-US" dirty="0"/>
@@ -3919,7 +3924,7 @@
           <a:lstStyle/>
           <a:p>
             <a:r>
-              <a:rPr lang="en-US" altLang="zh-CN" sz="3600" baseline="30000" dirty="0" smtClean="0">
+              <a:rPr lang="en-US" altLang="zh-CN" sz="3600" baseline="30000" dirty="0">
                 <a:latin typeface="Gadugi" panose="020B0502040204020203" pitchFamily="34" charset="0"/>
                 <a:ea typeface="Gadugi" panose="020B0502040204020203" pitchFamily="34" charset="0"/>
                 <a:cs typeface="Arial Unicode MS" panose="020B0604020202020204" pitchFamily="34" charset="-122"/>
@@ -3933,16 +3938,9 @@
                 <a:latin typeface="+mn-ea"/>
                 <a:cs typeface="Arial Unicode MS" panose="020B0604020202020204" pitchFamily="34" charset="-122"/>
               </a:rPr>
-              <a:t>比特</a:t>
-            </a:r>
-            <a:r>
-              <a:rPr lang="zh-CN" altLang="en-US" sz="2400" dirty="0" smtClean="0">
-                <a:latin typeface="+mn-ea"/>
-                <a:cs typeface="Arial Unicode MS" panose="020B0604020202020204" pitchFamily="34" charset="-122"/>
-              </a:rPr>
-              <a:t>币以如下的步骤运行网络：</a:t>
-            </a:r>
-            <a:endParaRPr lang="en-US" altLang="zh-CN" sz="2400" dirty="0" smtClean="0">
+              <a:t>比特币以如下的步骤运行网络：</a:t>
+            </a:r>
+            <a:endParaRPr lang="en-US" altLang="zh-CN" sz="2400" dirty="0">
               <a:latin typeface="+mn-ea"/>
               <a:cs typeface="Arial Unicode MS" panose="020B0604020202020204" pitchFamily="34" charset="-122"/>
             </a:endParaRPr>
@@ -3952,36 +3950,13 @@
               <a:buAutoNum type="arabicPeriod"/>
             </a:pPr>
             <a:r>
-              <a:rPr lang="zh-CN" altLang="en-US" sz="2400" dirty="0" smtClean="0">
+              <a:rPr lang="zh-CN" altLang="en-US" sz="2400" dirty="0">
                 <a:latin typeface="+mn-ea"/>
                 <a:cs typeface="Arial Unicode MS" panose="020B0604020202020204" pitchFamily="34" charset="-122"/>
               </a:rPr>
               <a:t>产生新的交易，并广播到全网；</a:t>
             </a:r>
-            <a:endParaRPr lang="en-US" altLang="zh-CN" sz="2400" dirty="0" smtClean="0">
-              <a:latin typeface="+mn-ea"/>
-              <a:cs typeface="Arial Unicode MS" panose="020B0604020202020204" pitchFamily="34" charset="-122"/>
-            </a:endParaRPr>
-          </a:p>
-          <a:p>
-            <a:pPr marL="342900" indent="-342900">
-              <a:buAutoNum type="arabicPeriod"/>
-            </a:pPr>
-            <a:r>
-              <a:rPr lang="en-US" altLang="zh-CN" sz="2400" dirty="0" smtClean="0">
-                <a:latin typeface="+mn-ea"/>
-                <a:cs typeface="Arial Unicode MS" panose="020B0604020202020204" pitchFamily="34" charset="-122"/>
-              </a:rPr>
-              <a:t> </a:t>
-            </a:r>
-            <a:r>
-              <a:rPr lang="zh-CN" altLang="en-US" sz="2400" dirty="0" smtClean="0">
-                <a:latin typeface="+mn-ea"/>
-                <a:cs typeface="Arial Unicode MS" panose="020B0604020202020204" pitchFamily="34" charset="-122"/>
-              </a:rPr>
-              <a:t>每个节点都收集交易内容，将其放到一个区块中；</a:t>
-            </a:r>
-            <a:endParaRPr lang="en-US" altLang="zh-CN" sz="2400" dirty="0" smtClean="0">
+            <a:endParaRPr lang="en-US" altLang="zh-CN" sz="2400" dirty="0">
               <a:latin typeface="+mn-ea"/>
               <a:cs typeface="Arial Unicode MS" panose="020B0604020202020204" pitchFamily="34" charset="-122"/>
             </a:endParaRPr>
@@ -3998,27 +3973,13 @@
               <a:t> </a:t>
             </a:r>
             <a:r>
-              <a:rPr lang="zh-CN" altLang="en-US" sz="2400" dirty="0" smtClean="0">
+              <a:rPr lang="zh-CN" altLang="en-US" sz="2400" dirty="0">
                 <a:latin typeface="+mn-ea"/>
                 <a:cs typeface="Arial Unicode MS" panose="020B0604020202020204" pitchFamily="34" charset="-122"/>
               </a:rPr>
-              <a:t>为了创建区块，每个节点都进行</a:t>
-            </a:r>
-            <a:r>
-              <a:rPr lang="en-US" altLang="zh-CN" sz="2400" dirty="0" err="1" smtClean="0">
-                <a:latin typeface="+mn-ea"/>
-                <a:cs typeface="Arial Unicode MS" panose="020B0604020202020204" pitchFamily="34" charset="-122"/>
-              </a:rPr>
-              <a:t>PoW</a:t>
-            </a:r>
-            <a:r>
-              <a:rPr lang="zh-CN" altLang="en-US" sz="2400" dirty="0" smtClean="0">
-                <a:latin typeface="+mn-ea"/>
-                <a:cs typeface="Arial Unicode MS" panose="020B0604020202020204" pitchFamily="34" charset="-122"/>
-              </a:rPr>
-              <a:t>过程；</a:t>
-            </a:r>
-            <a:endParaRPr lang="en-US" altLang="zh-CN" sz="2400" dirty="0" smtClean="0">
+              <a:t>每个节点都收集交易内容，将其放到一个区块中；</a:t>
+            </a:r>
+            <a:endParaRPr lang="en-US" altLang="zh-CN" sz="2400" dirty="0">
               <a:latin typeface="+mn-ea"/>
               <a:cs typeface="Arial Unicode MS" panose="020B0604020202020204" pitchFamily="34" charset="-122"/>
             </a:endParaRPr>
@@ -4035,27 +3996,27 @@
               <a:t> </a:t>
             </a:r>
             <a:r>
-              <a:rPr lang="zh-CN" altLang="en-US" sz="2400" dirty="0" smtClean="0">
+              <a:rPr lang="zh-CN" altLang="en-US" sz="2400" dirty="0">
                 <a:latin typeface="+mn-ea"/>
                 <a:cs typeface="Arial Unicode MS" panose="020B0604020202020204" pitchFamily="34" charset="-122"/>
               </a:rPr>
-              <a:t>一旦某个节点完成</a:t>
-            </a:r>
-            <a:r>
-              <a:rPr lang="en-US" altLang="zh-CN" sz="2400" dirty="0" err="1" smtClean="0">
+              <a:t>为了创建区块，每个节点都进行</a:t>
+            </a:r>
+            <a:r>
+              <a:rPr lang="en-US" altLang="zh-CN" sz="2400" dirty="0" err="1">
                 <a:latin typeface="+mn-ea"/>
                 <a:cs typeface="Arial Unicode MS" panose="020B0604020202020204" pitchFamily="34" charset="-122"/>
               </a:rPr>
               <a:t>PoW</a:t>
             </a:r>
             <a:r>
-              <a:rPr lang="zh-CN" altLang="en-US" sz="2400" dirty="0" smtClean="0">
+              <a:rPr lang="zh-CN" altLang="en-US" sz="2400" dirty="0">
                 <a:latin typeface="+mn-ea"/>
                 <a:cs typeface="Arial Unicode MS" panose="020B0604020202020204" pitchFamily="34" charset="-122"/>
               </a:rPr>
-              <a:t>过程，就会将新建的区块向全网广播；</a:t>
-            </a:r>
-            <a:endParaRPr lang="en-US" altLang="zh-CN" sz="2400" dirty="0" smtClean="0">
+              <a:t>过程；</a:t>
+            </a:r>
+            <a:endParaRPr lang="en-US" altLang="zh-CN" sz="2400" dirty="0">
               <a:latin typeface="+mn-ea"/>
               <a:cs typeface="Arial Unicode MS" panose="020B0604020202020204" pitchFamily="34" charset="-122"/>
             </a:endParaRPr>
@@ -4072,13 +4033,27 @@
               <a:t> </a:t>
             </a:r>
             <a:r>
-              <a:rPr lang="zh-CN" altLang="en-US" sz="2400" dirty="0" smtClean="0">
+              <a:rPr lang="zh-CN" altLang="en-US" sz="2400" dirty="0">
                 <a:latin typeface="+mn-ea"/>
                 <a:cs typeface="Arial Unicode MS" panose="020B0604020202020204" pitchFamily="34" charset="-122"/>
               </a:rPr>
-              <a:t>当节点收到区块时，如果区块内交易有效，没有被支付过，就会接收该区块；</a:t>
-            </a:r>
-            <a:endParaRPr lang="en-US" altLang="zh-CN" sz="2400" dirty="0" smtClean="0">
+              <a:t>一旦某个节点完成</a:t>
+            </a:r>
+            <a:r>
+              <a:rPr lang="en-US" altLang="zh-CN" sz="2400" dirty="0" err="1">
+                <a:latin typeface="+mn-ea"/>
+                <a:cs typeface="Arial Unicode MS" panose="020B0604020202020204" pitchFamily="34" charset="-122"/>
+              </a:rPr>
+              <a:t>PoW</a:t>
+            </a:r>
+            <a:r>
+              <a:rPr lang="zh-CN" altLang="en-US" sz="2400" dirty="0">
+                <a:latin typeface="+mn-ea"/>
+                <a:cs typeface="Arial Unicode MS" panose="020B0604020202020204" pitchFamily="34" charset="-122"/>
+              </a:rPr>
+              <a:t>过程，就会将新建的区块向全网广播；</a:t>
+            </a:r>
+            <a:endParaRPr lang="en-US" altLang="zh-CN" sz="2400" dirty="0">
               <a:latin typeface="+mn-ea"/>
               <a:cs typeface="Arial Unicode MS" panose="020B0604020202020204" pitchFamily="34" charset="-122"/>
             </a:endParaRPr>
@@ -4095,27 +4070,50 @@
               <a:t> </a:t>
             </a:r>
             <a:r>
-              <a:rPr lang="zh-CN" altLang="en-US" sz="2400" dirty="0" smtClean="0">
+              <a:rPr lang="zh-CN" altLang="en-US" sz="2400" dirty="0">
+                <a:latin typeface="+mn-ea"/>
+                <a:cs typeface="Arial Unicode MS" panose="020B0604020202020204" pitchFamily="34" charset="-122"/>
+              </a:rPr>
+              <a:t>当节点收到区块时，如果区块内交易有效，没有被支付过，就会接收该区块；</a:t>
+            </a:r>
+            <a:endParaRPr lang="en-US" altLang="zh-CN" sz="2400" dirty="0">
+              <a:latin typeface="+mn-ea"/>
+              <a:cs typeface="Arial Unicode MS" panose="020B0604020202020204" pitchFamily="34" charset="-122"/>
+            </a:endParaRPr>
+          </a:p>
+          <a:p>
+            <a:pPr marL="342900" indent="-342900">
+              <a:buAutoNum type="arabicPeriod"/>
+            </a:pPr>
+            <a:r>
+              <a:rPr lang="en-US" altLang="zh-CN" sz="2400" dirty="0">
+                <a:latin typeface="+mn-ea"/>
+                <a:cs typeface="Arial Unicode MS" panose="020B0604020202020204" pitchFamily="34" charset="-122"/>
+              </a:rPr>
+              <a:t> </a:t>
+            </a:r>
+            <a:r>
+              <a:rPr lang="zh-CN" altLang="en-US" sz="2400" dirty="0">
                 <a:latin typeface="+mn-ea"/>
                 <a:cs typeface="Arial Unicode MS" panose="020B0604020202020204" pitchFamily="34" charset="-122"/>
               </a:rPr>
               <a:t>区块接受新的区块时，会开始新的区块创建工作，待创建区块的</a:t>
             </a:r>
             <a:r>
-              <a:rPr lang="en-US" altLang="zh-CN" sz="2400" dirty="0" err="1" smtClean="0">
+              <a:rPr lang="en-US" altLang="zh-CN" sz="2400" dirty="0" err="1">
                 <a:latin typeface="+mn-ea"/>
                 <a:cs typeface="Arial Unicode MS" panose="020B0604020202020204" pitchFamily="34" charset="-122"/>
               </a:rPr>
               <a:t>prevhash</a:t>
             </a:r>
             <a:r>
-              <a:rPr lang="zh-CN" altLang="en-US" sz="2400" dirty="0" smtClean="0">
+              <a:rPr lang="zh-CN" altLang="en-US" sz="2400" dirty="0">
                 <a:latin typeface="+mn-ea"/>
                 <a:cs typeface="Arial Unicode MS" panose="020B0604020202020204" pitchFamily="34" charset="-122"/>
               </a:rPr>
               <a:t>指向刚刚接受的区块。</a:t>
             </a:r>
-            <a:endParaRPr lang="en-US" altLang="zh-CN" sz="2400" dirty="0" smtClean="0">
+            <a:endParaRPr lang="en-US" altLang="zh-CN" sz="2400" dirty="0">
               <a:latin typeface="+mn-ea"/>
               <a:cs typeface="Arial Unicode MS" panose="020B0604020202020204" pitchFamily="34" charset="-122"/>
             </a:endParaRPr>
@@ -4175,7 +4173,7 @@
           <a:lstStyle/>
           <a:p>
             <a:r>
-              <a:rPr lang="en-US" altLang="zh-CN" sz="3600" baseline="30000" dirty="0" smtClean="0">
+              <a:rPr lang="en-US" altLang="zh-CN" sz="3600" baseline="30000" dirty="0">
                 <a:latin typeface="Gadugi" panose="020B0502040204020203" pitchFamily="34" charset="0"/>
                 <a:ea typeface="Gadugi" panose="020B0502040204020203" pitchFamily="34" charset="0"/>
                 <a:cs typeface="Arial Unicode MS" panose="020B0604020202020204" pitchFamily="34" charset="-122"/>
@@ -4185,7 +4183,7 @@
           </a:p>
           <a:p>
             <a:r>
-              <a:rPr lang="zh-CN" altLang="en-US" sz="2400" dirty="0" smtClean="0">
+              <a:rPr lang="zh-CN" altLang="en-US" sz="2400" dirty="0">
                 <a:latin typeface="+mn-ea"/>
                 <a:cs typeface="Arial Unicode MS" panose="020B0604020202020204" pitchFamily="34" charset="-122"/>
               </a:rPr>

</xml_diff>